<commit_message>
Add a bunch of stuff
</commit_message>
<xml_diff>
--- a/figures/figures.pptx
+++ b/figures/figures.pptx
@@ -5,7 +5,7 @@
     <p:sldMasterId id="2147483660" r:id="rId1"/>
   </p:sldMasterIdLst>
   <p:notesMasterIdLst>
-    <p:notesMasterId r:id="rId11"/>
+    <p:notesMasterId r:id="rId15"/>
   </p:notesMasterIdLst>
   <p:sldIdLst>
     <p:sldId id="275" r:id="rId2"/>
@@ -17,6 +17,10 @@
     <p:sldId id="282" r:id="rId8"/>
     <p:sldId id="283" r:id="rId9"/>
     <p:sldId id="286" r:id="rId10"/>
+    <p:sldId id="287" r:id="rId11"/>
+    <p:sldId id="288" r:id="rId12"/>
+    <p:sldId id="289" r:id="rId13"/>
+    <p:sldId id="290" r:id="rId14"/>
   </p:sldIdLst>
   <p:sldSz cx="12192000" cy="7315200"/>
   <p:notesSz cx="6858000" cy="9144000"/>
@@ -205,7 +209,7 @@
           <a:p>
             <a:fld id="{C1CC4EAE-1B05-DC4C-927B-EC74A4CD80C0}" type="datetimeFigureOut">
               <a:rPr lang="en-US" smtClean="0"/>
-              <a:t>4/28/23</a:t>
+              <a:t>5/16/23</a:t>
             </a:fld>
             <a:endParaRPr lang="en-US"/>
           </a:p>
@@ -939,7 +943,7 @@
           <a:p>
             <a:fld id="{36FE6AC1-C819-864F-8E02-BCA5800F2D33}" type="datetimeFigureOut">
               <a:rPr lang="en-US" smtClean="0"/>
-              <a:t>4/28/23</a:t>
+              <a:t>5/16/23</a:t>
             </a:fld>
             <a:endParaRPr lang="en-US"/>
           </a:p>
@@ -1109,7 +1113,7 @@
           <a:p>
             <a:fld id="{36FE6AC1-C819-864F-8E02-BCA5800F2D33}" type="datetimeFigureOut">
               <a:rPr lang="en-US" smtClean="0"/>
-              <a:t>4/28/23</a:t>
+              <a:t>5/16/23</a:t>
             </a:fld>
             <a:endParaRPr lang="en-US"/>
           </a:p>
@@ -1289,7 +1293,7 @@
           <a:p>
             <a:fld id="{36FE6AC1-C819-864F-8E02-BCA5800F2D33}" type="datetimeFigureOut">
               <a:rPr lang="en-US" smtClean="0"/>
-              <a:t>4/28/23</a:t>
+              <a:t>5/16/23</a:t>
             </a:fld>
             <a:endParaRPr lang="en-US"/>
           </a:p>
@@ -1459,7 +1463,7 @@
           <a:p>
             <a:fld id="{36FE6AC1-C819-864F-8E02-BCA5800F2D33}" type="datetimeFigureOut">
               <a:rPr lang="en-US" smtClean="0"/>
-              <a:t>4/28/23</a:t>
+              <a:t>5/16/23</a:t>
             </a:fld>
             <a:endParaRPr lang="en-US"/>
           </a:p>
@@ -1705,7 +1709,7 @@
           <a:p>
             <a:fld id="{36FE6AC1-C819-864F-8E02-BCA5800F2D33}" type="datetimeFigureOut">
               <a:rPr lang="en-US" smtClean="0"/>
-              <a:t>4/28/23</a:t>
+              <a:t>5/16/23</a:t>
             </a:fld>
             <a:endParaRPr lang="en-US"/>
           </a:p>
@@ -1937,7 +1941,7 @@
           <a:p>
             <a:fld id="{36FE6AC1-C819-864F-8E02-BCA5800F2D33}" type="datetimeFigureOut">
               <a:rPr lang="en-US" smtClean="0"/>
-              <a:t>4/28/23</a:t>
+              <a:t>5/16/23</a:t>
             </a:fld>
             <a:endParaRPr lang="en-US"/>
           </a:p>
@@ -2304,7 +2308,7 @@
           <a:p>
             <a:fld id="{36FE6AC1-C819-864F-8E02-BCA5800F2D33}" type="datetimeFigureOut">
               <a:rPr lang="en-US" smtClean="0"/>
-              <a:t>4/28/23</a:t>
+              <a:t>5/16/23</a:t>
             </a:fld>
             <a:endParaRPr lang="en-US"/>
           </a:p>
@@ -2422,7 +2426,7 @@
           <a:p>
             <a:fld id="{36FE6AC1-C819-864F-8E02-BCA5800F2D33}" type="datetimeFigureOut">
               <a:rPr lang="en-US" smtClean="0"/>
-              <a:t>4/28/23</a:t>
+              <a:t>5/16/23</a:t>
             </a:fld>
             <a:endParaRPr lang="en-US"/>
           </a:p>
@@ -2517,7 +2521,7 @@
           <a:p>
             <a:fld id="{36FE6AC1-C819-864F-8E02-BCA5800F2D33}" type="datetimeFigureOut">
               <a:rPr lang="en-US" smtClean="0"/>
-              <a:t>4/28/23</a:t>
+              <a:t>5/16/23</a:t>
             </a:fld>
             <a:endParaRPr lang="en-US"/>
           </a:p>
@@ -2794,7 +2798,7 @@
           <a:p>
             <a:fld id="{36FE6AC1-C819-864F-8E02-BCA5800F2D33}" type="datetimeFigureOut">
               <a:rPr lang="en-US" smtClean="0"/>
-              <a:t>4/28/23</a:t>
+              <a:t>5/16/23</a:t>
             </a:fld>
             <a:endParaRPr lang="en-US"/>
           </a:p>
@@ -3051,7 +3055,7 @@
           <a:p>
             <a:fld id="{36FE6AC1-C819-864F-8E02-BCA5800F2D33}" type="datetimeFigureOut">
               <a:rPr lang="en-US" smtClean="0"/>
-              <a:t>4/28/23</a:t>
+              <a:t>5/16/23</a:t>
             </a:fld>
             <a:endParaRPr lang="en-US"/>
           </a:p>
@@ -3264,7 +3268,7 @@
           <a:p>
             <a:fld id="{36FE6AC1-C819-864F-8E02-BCA5800F2D33}" type="datetimeFigureOut">
               <a:rPr lang="en-US" smtClean="0"/>
-              <a:t>4/28/23</a:t>
+              <a:t>5/16/23</a:t>
             </a:fld>
             <a:endParaRPr lang="en-US"/>
           </a:p>
@@ -4839,6 +4843,270 @@
     <p:extLst>
       <p:ext uri="{BB962C8B-B14F-4D97-AF65-F5344CB8AC3E}">
         <p14:creationId xmlns:p14="http://schemas.microsoft.com/office/powerpoint/2010/main" val="2535394463"/>
+      </p:ext>
+    </p:extLst>
+  </p:cSld>
+  <p:clrMapOvr>
+    <a:masterClrMapping/>
+  </p:clrMapOvr>
+</p:sld>
+</file>
+
+<file path=ppt/slides/slide10.xml><?xml version="1.0" encoding="utf-8"?>
+<p:sld xmlns:a="http://schemas.openxmlformats.org/drawingml/2006/main" xmlns:r="http://schemas.openxmlformats.org/officeDocument/2006/relationships" xmlns:p="http://schemas.openxmlformats.org/presentationml/2006/main">
+  <p:cSld>
+    <p:spTree>
+      <p:nvGrpSpPr>
+        <p:cNvPr id="1" name=""/>
+        <p:cNvGrpSpPr/>
+        <p:nvPr/>
+      </p:nvGrpSpPr>
+      <p:grpSpPr>
+        <a:xfrm>
+          <a:off x="0" y="0"/>
+          <a:ext cx="0" cy="0"/>
+          <a:chOff x="0" y="0"/>
+          <a:chExt cx="0" cy="0"/>
+        </a:xfrm>
+      </p:grpSpPr>
+      <p:pic>
+        <p:nvPicPr>
+          <p:cNvPr id="89" name="Graphic 88">
+            <a:extLst>
+              <a:ext uri="{FF2B5EF4-FFF2-40B4-BE49-F238E27FC236}">
+                <a16:creationId xmlns:a16="http://schemas.microsoft.com/office/drawing/2014/main" id="{1587C859-C95E-1CF0-C8C4-BF14D3BB5C55}"/>
+              </a:ext>
+            </a:extLst>
+          </p:cNvPr>
+          <p:cNvPicPr>
+            <a:picLocks noChangeAspect="1"/>
+          </p:cNvPicPr>
+          <p:nvPr/>
+        </p:nvPicPr>
+        <p:blipFill>
+          <a:blip r:embed="rId2">
+            <a:extLst>
+              <a:ext uri="{96DAC541-7B7A-43D3-8B79-37D633B846F1}">
+                <asvg:svgBlip xmlns:asvg="http://schemas.microsoft.com/office/drawing/2016/SVG/main" r:embed="rId3"/>
+              </a:ext>
+            </a:extLst>
+          </a:blip>
+          <a:stretch>
+            <a:fillRect/>
+          </a:stretch>
+        </p:blipFill>
+        <p:spPr>
+          <a:xfrm>
+            <a:off x="874643" y="160006"/>
+            <a:ext cx="10681579" cy="7155194"/>
+          </a:xfrm>
+          <a:prstGeom prst="rect">
+            <a:avLst/>
+          </a:prstGeom>
+        </p:spPr>
+      </p:pic>
+    </p:spTree>
+    <p:extLst>
+      <p:ext uri="{BB962C8B-B14F-4D97-AF65-F5344CB8AC3E}">
+        <p14:creationId xmlns:p14="http://schemas.microsoft.com/office/powerpoint/2010/main" val="3539631220"/>
+      </p:ext>
+    </p:extLst>
+  </p:cSld>
+  <p:clrMapOvr>
+    <a:masterClrMapping/>
+  </p:clrMapOvr>
+</p:sld>
+</file>
+
+<file path=ppt/slides/slide11.xml><?xml version="1.0" encoding="utf-8"?>
+<p:sld xmlns:a="http://schemas.openxmlformats.org/drawingml/2006/main" xmlns:r="http://schemas.openxmlformats.org/officeDocument/2006/relationships" xmlns:p="http://schemas.openxmlformats.org/presentationml/2006/main">
+  <p:cSld>
+    <p:spTree>
+      <p:nvGrpSpPr>
+        <p:cNvPr id="1" name=""/>
+        <p:cNvGrpSpPr/>
+        <p:nvPr/>
+      </p:nvGrpSpPr>
+      <p:grpSpPr>
+        <a:xfrm>
+          <a:off x="0" y="0"/>
+          <a:ext cx="0" cy="0"/>
+          <a:chOff x="0" y="0"/>
+          <a:chExt cx="0" cy="0"/>
+        </a:xfrm>
+      </p:grpSpPr>
+      <p:pic>
+        <p:nvPicPr>
+          <p:cNvPr id="4" name="Graphic 3">
+            <a:extLst>
+              <a:ext uri="{FF2B5EF4-FFF2-40B4-BE49-F238E27FC236}">
+                <a16:creationId xmlns:a16="http://schemas.microsoft.com/office/drawing/2014/main" id="{48523564-A104-02DF-C399-B4358E43D3B2}"/>
+              </a:ext>
+            </a:extLst>
+          </p:cNvPr>
+          <p:cNvPicPr>
+            <a:picLocks noChangeAspect="1"/>
+          </p:cNvPicPr>
+          <p:nvPr/>
+        </p:nvPicPr>
+        <p:blipFill>
+          <a:blip r:embed="rId2">
+            <a:extLst>
+              <a:ext uri="{96DAC541-7B7A-43D3-8B79-37D633B846F1}">
+                <asvg:svgBlip xmlns:asvg="http://schemas.microsoft.com/office/drawing/2016/SVG/main" r:embed="rId3"/>
+              </a:ext>
+            </a:extLst>
+          </a:blip>
+          <a:stretch>
+            <a:fillRect/>
+          </a:stretch>
+        </p:blipFill>
+        <p:spPr>
+          <a:xfrm>
+            <a:off x="611819" y="1178253"/>
+            <a:ext cx="11580181" cy="4958693"/>
+          </a:xfrm>
+          <a:prstGeom prst="rect">
+            <a:avLst/>
+          </a:prstGeom>
+        </p:spPr>
+      </p:pic>
+    </p:spTree>
+    <p:extLst>
+      <p:ext uri="{BB962C8B-B14F-4D97-AF65-F5344CB8AC3E}">
+        <p14:creationId xmlns:p14="http://schemas.microsoft.com/office/powerpoint/2010/main" val="2049132997"/>
+      </p:ext>
+    </p:extLst>
+  </p:cSld>
+  <p:clrMapOvr>
+    <a:masterClrMapping/>
+  </p:clrMapOvr>
+</p:sld>
+</file>
+
+<file path=ppt/slides/slide12.xml><?xml version="1.0" encoding="utf-8"?>
+<p:sld xmlns:a="http://schemas.openxmlformats.org/drawingml/2006/main" xmlns:r="http://schemas.openxmlformats.org/officeDocument/2006/relationships" xmlns:p="http://schemas.openxmlformats.org/presentationml/2006/main">
+  <p:cSld>
+    <p:spTree>
+      <p:nvGrpSpPr>
+        <p:cNvPr id="1" name=""/>
+        <p:cNvGrpSpPr/>
+        <p:nvPr/>
+      </p:nvGrpSpPr>
+      <p:grpSpPr>
+        <a:xfrm>
+          <a:off x="0" y="0"/>
+          <a:ext cx="0" cy="0"/>
+          <a:chOff x="0" y="0"/>
+          <a:chExt cx="0" cy="0"/>
+        </a:xfrm>
+      </p:grpSpPr>
+      <p:pic>
+        <p:nvPicPr>
+          <p:cNvPr id="4" name="Graphic 3">
+            <a:extLst>
+              <a:ext uri="{FF2B5EF4-FFF2-40B4-BE49-F238E27FC236}">
+                <a16:creationId xmlns:a16="http://schemas.microsoft.com/office/drawing/2014/main" id="{7D9169C0-7FA5-6E3A-CD13-6856CB505F8D}"/>
+              </a:ext>
+            </a:extLst>
+          </p:cNvPr>
+          <p:cNvPicPr>
+            <a:picLocks noChangeAspect="1"/>
+          </p:cNvPicPr>
+          <p:nvPr/>
+        </p:nvPicPr>
+        <p:blipFill>
+          <a:blip r:embed="rId2">
+            <a:extLst>
+              <a:ext uri="{96DAC541-7B7A-43D3-8B79-37D633B846F1}">
+                <asvg:svgBlip xmlns:asvg="http://schemas.microsoft.com/office/drawing/2016/SVG/main" r:embed="rId3"/>
+              </a:ext>
+            </a:extLst>
+          </a:blip>
+          <a:stretch>
+            <a:fillRect/>
+          </a:stretch>
+        </p:blipFill>
+        <p:spPr>
+          <a:xfrm>
+            <a:off x="1208119" y="137161"/>
+            <a:ext cx="9775762" cy="7040877"/>
+          </a:xfrm>
+          <a:prstGeom prst="rect">
+            <a:avLst/>
+          </a:prstGeom>
+        </p:spPr>
+      </p:pic>
+    </p:spTree>
+    <p:extLst>
+      <p:ext uri="{BB962C8B-B14F-4D97-AF65-F5344CB8AC3E}">
+        <p14:creationId xmlns:p14="http://schemas.microsoft.com/office/powerpoint/2010/main" val="3998073265"/>
+      </p:ext>
+    </p:extLst>
+  </p:cSld>
+  <p:clrMapOvr>
+    <a:masterClrMapping/>
+  </p:clrMapOvr>
+</p:sld>
+</file>
+
+<file path=ppt/slides/slide13.xml><?xml version="1.0" encoding="utf-8"?>
+<p:sld xmlns:a="http://schemas.openxmlformats.org/drawingml/2006/main" xmlns:r="http://schemas.openxmlformats.org/officeDocument/2006/relationships" xmlns:p="http://schemas.openxmlformats.org/presentationml/2006/main">
+  <p:cSld>
+    <p:spTree>
+      <p:nvGrpSpPr>
+        <p:cNvPr id="1" name=""/>
+        <p:cNvGrpSpPr/>
+        <p:nvPr/>
+      </p:nvGrpSpPr>
+      <p:grpSpPr>
+        <a:xfrm>
+          <a:off x="0" y="0"/>
+          <a:ext cx="0" cy="0"/>
+          <a:chOff x="0" y="0"/>
+          <a:chExt cx="0" cy="0"/>
+        </a:xfrm>
+      </p:grpSpPr>
+      <p:pic>
+        <p:nvPicPr>
+          <p:cNvPr id="4" name="Graphic 3">
+            <a:extLst>
+              <a:ext uri="{FF2B5EF4-FFF2-40B4-BE49-F238E27FC236}">
+                <a16:creationId xmlns:a16="http://schemas.microsoft.com/office/drawing/2014/main" id="{3490AB5A-FF5C-5381-308C-711B9AC59E4E}"/>
+              </a:ext>
+            </a:extLst>
+          </p:cNvPr>
+          <p:cNvPicPr>
+            <a:picLocks noChangeAspect="1"/>
+          </p:cNvPicPr>
+          <p:nvPr/>
+        </p:nvPicPr>
+        <p:blipFill>
+          <a:blip r:embed="rId2">
+            <a:extLst>
+              <a:ext uri="{96DAC541-7B7A-43D3-8B79-37D633B846F1}">
+                <asvg:svgBlip xmlns:asvg="http://schemas.microsoft.com/office/drawing/2016/SVG/main" r:embed="rId3"/>
+              </a:ext>
+            </a:extLst>
+          </a:blip>
+          <a:stretch>
+            <a:fillRect/>
+          </a:stretch>
+        </p:blipFill>
+        <p:spPr>
+          <a:xfrm>
+            <a:off x="1251965" y="0"/>
+            <a:ext cx="10210583" cy="7129803"/>
+          </a:xfrm>
+          <a:prstGeom prst="rect">
+            <a:avLst/>
+          </a:prstGeom>
+        </p:spPr>
+      </p:pic>
+    </p:spTree>
+    <p:extLst>
+      <p:ext uri="{BB962C8B-B14F-4D97-AF65-F5344CB8AC3E}">
+        <p14:creationId xmlns:p14="http://schemas.microsoft.com/office/powerpoint/2010/main" val="3082640235"/>
       </p:ext>
     </p:extLst>
   </p:cSld>
@@ -9903,8 +10171,8 @@
           </a:p>
         </p:txBody>
       </p:sp>
-      <mc:AlternateContent xmlns:mc="http://schemas.openxmlformats.org/markup-compatibility/2006">
-        <mc:Choice xmlns:a14="http://schemas.microsoft.com/office/drawing/2010/main" Requires="a14">
+      <mc:AlternateContent xmlns:mc="http://schemas.openxmlformats.org/markup-compatibility/2006" xmlns:a14="http://schemas.microsoft.com/office/drawing/2010/main">
+        <mc:Choice Requires="a14">
           <p:sp>
             <p:nvSpPr>
               <p:cNvPr id="42" name="TextBox 41">
@@ -10043,7 +10311,7 @@
             </p:txBody>
           </p:sp>
         </mc:Choice>
-        <mc:Fallback>
+        <mc:Fallback xmlns="">
           <p:sp>
             <p:nvSpPr>
               <p:cNvPr id="42" name="TextBox 41">
@@ -11026,8 +11294,8 @@
           </p:txBody>
         </p:sp>
       </p:grpSp>
-      <mc:AlternateContent xmlns:mc="http://schemas.openxmlformats.org/markup-compatibility/2006">
-        <mc:Choice xmlns:a14="http://schemas.microsoft.com/office/drawing/2010/main" Requires="a14">
+      <mc:AlternateContent xmlns:mc="http://schemas.openxmlformats.org/markup-compatibility/2006" xmlns:a14="http://schemas.microsoft.com/office/drawing/2010/main">
+        <mc:Choice Requires="a14">
           <p:sp>
             <p:nvSpPr>
               <p:cNvPr id="80" name="TextBox 79">
@@ -11166,7 +11434,7 @@
             </p:txBody>
           </p:sp>
         </mc:Choice>
-        <mc:Fallback>
+        <mc:Fallback xmlns="">
           <p:sp>
             <p:nvSpPr>
               <p:cNvPr id="80" name="TextBox 79">
@@ -12157,8 +12425,8 @@
             </a:p>
           </p:txBody>
         </p:sp>
-        <mc:AlternateContent xmlns:mc="http://schemas.openxmlformats.org/markup-compatibility/2006">
-          <mc:Choice xmlns:a14="http://schemas.microsoft.com/office/drawing/2010/main" Requires="a14">
+        <mc:AlternateContent xmlns:mc="http://schemas.openxmlformats.org/markup-compatibility/2006" xmlns:a14="http://schemas.microsoft.com/office/drawing/2010/main">
+          <mc:Choice Requires="a14">
             <p:sp>
               <p:nvSpPr>
                 <p:cNvPr id="101" name="TextBox 100">
@@ -12227,7 +12495,7 @@
               </p:txBody>
             </p:sp>
           </mc:Choice>
-          <mc:Fallback>
+          <mc:Fallback xmlns="">
             <p:sp>
               <p:nvSpPr>
                 <p:cNvPr id="101" name="TextBox 100">
@@ -12342,8 +12610,8 @@
             </a:p>
           </p:txBody>
         </p:sp>
-        <mc:AlternateContent xmlns:mc="http://schemas.openxmlformats.org/markup-compatibility/2006">
-          <mc:Choice xmlns:a14="http://schemas.microsoft.com/office/drawing/2010/main" Requires="a14">
+        <mc:AlternateContent xmlns:mc="http://schemas.openxmlformats.org/markup-compatibility/2006" xmlns:a14="http://schemas.microsoft.com/office/drawing/2010/main">
+          <mc:Choice Requires="a14">
             <p:sp>
               <p:nvSpPr>
                 <p:cNvPr id="109" name="TextBox 108">
@@ -12412,7 +12680,7 @@
               </p:txBody>
             </p:sp>
           </mc:Choice>
-          <mc:Fallback>
+          <mc:Fallback xmlns="">
             <p:sp>
               <p:nvSpPr>
                 <p:cNvPr id="109" name="TextBox 108">
@@ -12527,8 +12795,8 @@
             </a:p>
           </p:txBody>
         </p:sp>
-        <mc:AlternateContent xmlns:mc="http://schemas.openxmlformats.org/markup-compatibility/2006">
-          <mc:Choice xmlns:a14="http://schemas.microsoft.com/office/drawing/2010/main" Requires="a14">
+        <mc:AlternateContent xmlns:mc="http://schemas.openxmlformats.org/markup-compatibility/2006" xmlns:a14="http://schemas.microsoft.com/office/drawing/2010/main">
+          <mc:Choice Requires="a14">
             <p:sp>
               <p:nvSpPr>
                 <p:cNvPr id="112" name="TextBox 111">
@@ -12597,7 +12865,7 @@
               </p:txBody>
             </p:sp>
           </mc:Choice>
-          <mc:Fallback>
+          <mc:Fallback xmlns="">
             <p:sp>
               <p:nvSpPr>
                 <p:cNvPr id="112" name="TextBox 111">
@@ -12712,8 +12980,8 @@
             </a:p>
           </p:txBody>
         </p:sp>
-        <mc:AlternateContent xmlns:mc="http://schemas.openxmlformats.org/markup-compatibility/2006">
-          <mc:Choice xmlns:a14="http://schemas.microsoft.com/office/drawing/2010/main" Requires="a14">
+        <mc:AlternateContent xmlns:mc="http://schemas.openxmlformats.org/markup-compatibility/2006" xmlns:a14="http://schemas.microsoft.com/office/drawing/2010/main">
+          <mc:Choice Requires="a14">
             <p:sp>
               <p:nvSpPr>
                 <p:cNvPr id="115" name="TextBox 114">
@@ -12782,7 +13050,7 @@
               </p:txBody>
             </p:sp>
           </mc:Choice>
-          <mc:Fallback>
+          <mc:Fallback xmlns="">
             <p:sp>
               <p:nvSpPr>
                 <p:cNvPr id="115" name="TextBox 114">
@@ -12897,8 +13165,8 @@
             </a:p>
           </p:txBody>
         </p:sp>
-        <mc:AlternateContent xmlns:mc="http://schemas.openxmlformats.org/markup-compatibility/2006">
-          <mc:Choice xmlns:a14="http://schemas.microsoft.com/office/drawing/2010/main" Requires="a14">
+        <mc:AlternateContent xmlns:mc="http://schemas.openxmlformats.org/markup-compatibility/2006" xmlns:a14="http://schemas.microsoft.com/office/drawing/2010/main">
+          <mc:Choice Requires="a14">
             <p:sp>
               <p:nvSpPr>
                 <p:cNvPr id="118" name="TextBox 117">
@@ -12967,7 +13235,7 @@
               </p:txBody>
             </p:sp>
           </mc:Choice>
-          <mc:Fallback>
+          <mc:Fallback xmlns="">
             <p:sp>
               <p:nvSpPr>
                 <p:cNvPr id="118" name="TextBox 117">
@@ -13082,8 +13350,8 @@
             </a:p>
           </p:txBody>
         </p:sp>
-        <mc:AlternateContent xmlns:mc="http://schemas.openxmlformats.org/markup-compatibility/2006">
-          <mc:Choice xmlns:a14="http://schemas.microsoft.com/office/drawing/2010/main" Requires="a14">
+        <mc:AlternateContent xmlns:mc="http://schemas.openxmlformats.org/markup-compatibility/2006" xmlns:a14="http://schemas.microsoft.com/office/drawing/2010/main">
+          <mc:Choice Requires="a14">
             <p:sp>
               <p:nvSpPr>
                 <p:cNvPr id="121" name="TextBox 120">
@@ -13152,7 +13420,7 @@
               </p:txBody>
             </p:sp>
           </mc:Choice>
-          <mc:Fallback>
+          <mc:Fallback xmlns="">
             <p:sp>
               <p:nvSpPr>
                 <p:cNvPr id="121" name="TextBox 120">
@@ -14572,8 +14840,8 @@
             </a:p>
           </p:txBody>
         </p:sp>
-        <mc:AlternateContent xmlns:mc="http://schemas.openxmlformats.org/markup-compatibility/2006">
-          <mc:Choice xmlns:a14="http://schemas.microsoft.com/office/drawing/2010/main" Requires="a14">
+        <mc:AlternateContent xmlns:mc="http://schemas.openxmlformats.org/markup-compatibility/2006" xmlns:a14="http://schemas.microsoft.com/office/drawing/2010/main">
+          <mc:Choice Requires="a14">
             <p:sp>
               <p:nvSpPr>
                 <p:cNvPr id="144" name="TextBox 143">
@@ -14642,7 +14910,7 @@
               </p:txBody>
             </p:sp>
           </mc:Choice>
-          <mc:Fallback>
+          <mc:Fallback xmlns="">
             <p:sp>
               <p:nvSpPr>
                 <p:cNvPr id="144" name="TextBox 143">
@@ -14757,8 +15025,8 @@
             </a:p>
           </p:txBody>
         </p:sp>
-        <mc:AlternateContent xmlns:mc="http://schemas.openxmlformats.org/markup-compatibility/2006">
-          <mc:Choice xmlns:a14="http://schemas.microsoft.com/office/drawing/2010/main" Requires="a14">
+        <mc:AlternateContent xmlns:mc="http://schemas.openxmlformats.org/markup-compatibility/2006" xmlns:a14="http://schemas.microsoft.com/office/drawing/2010/main">
+          <mc:Choice Requires="a14">
             <p:sp>
               <p:nvSpPr>
                 <p:cNvPr id="147" name="TextBox 146">
@@ -14827,7 +15095,7 @@
               </p:txBody>
             </p:sp>
           </mc:Choice>
-          <mc:Fallback>
+          <mc:Fallback xmlns="">
             <p:sp>
               <p:nvSpPr>
                 <p:cNvPr id="147" name="TextBox 146">
@@ -14942,8 +15210,8 @@
             </a:p>
           </p:txBody>
         </p:sp>
-        <mc:AlternateContent xmlns:mc="http://schemas.openxmlformats.org/markup-compatibility/2006">
-          <mc:Choice xmlns:a14="http://schemas.microsoft.com/office/drawing/2010/main" Requires="a14">
+        <mc:AlternateContent xmlns:mc="http://schemas.openxmlformats.org/markup-compatibility/2006" xmlns:a14="http://schemas.microsoft.com/office/drawing/2010/main">
+          <mc:Choice Requires="a14">
             <p:sp>
               <p:nvSpPr>
                 <p:cNvPr id="150" name="TextBox 149">
@@ -15012,7 +15280,7 @@
               </p:txBody>
             </p:sp>
           </mc:Choice>
-          <mc:Fallback>
+          <mc:Fallback xmlns="">
             <p:sp>
               <p:nvSpPr>
                 <p:cNvPr id="150" name="TextBox 149">
@@ -15127,8 +15395,8 @@
             </a:p>
           </p:txBody>
         </p:sp>
-        <mc:AlternateContent xmlns:mc="http://schemas.openxmlformats.org/markup-compatibility/2006">
-          <mc:Choice xmlns:a14="http://schemas.microsoft.com/office/drawing/2010/main" Requires="a14">
+        <mc:AlternateContent xmlns:mc="http://schemas.openxmlformats.org/markup-compatibility/2006" xmlns:a14="http://schemas.microsoft.com/office/drawing/2010/main">
+          <mc:Choice Requires="a14">
             <p:sp>
               <p:nvSpPr>
                 <p:cNvPr id="153" name="TextBox 152">
@@ -15197,7 +15465,7 @@
               </p:txBody>
             </p:sp>
           </mc:Choice>
-          <mc:Fallback>
+          <mc:Fallback xmlns="">
             <p:sp>
               <p:nvSpPr>
                 <p:cNvPr id="153" name="TextBox 152">
@@ -15312,8 +15580,8 @@
             </a:p>
           </p:txBody>
         </p:sp>
-        <mc:AlternateContent xmlns:mc="http://schemas.openxmlformats.org/markup-compatibility/2006">
-          <mc:Choice xmlns:a14="http://schemas.microsoft.com/office/drawing/2010/main" Requires="a14">
+        <mc:AlternateContent xmlns:mc="http://schemas.openxmlformats.org/markup-compatibility/2006" xmlns:a14="http://schemas.microsoft.com/office/drawing/2010/main">
+          <mc:Choice Requires="a14">
             <p:sp>
               <p:nvSpPr>
                 <p:cNvPr id="156" name="TextBox 155">
@@ -15382,7 +15650,7 @@
               </p:txBody>
             </p:sp>
           </mc:Choice>
-          <mc:Fallback>
+          <mc:Fallback xmlns="">
             <p:sp>
               <p:nvSpPr>
                 <p:cNvPr id="156" name="TextBox 155">
@@ -15428,8 +15696,8 @@
           </mc:Fallback>
         </mc:AlternateContent>
       </p:grpSp>
-      <mc:AlternateContent xmlns:mc="http://schemas.openxmlformats.org/markup-compatibility/2006">
-        <mc:Choice xmlns:a14="http://schemas.microsoft.com/office/drawing/2010/main" Requires="a14">
+      <mc:AlternateContent xmlns:mc="http://schemas.openxmlformats.org/markup-compatibility/2006" xmlns:a14="http://schemas.microsoft.com/office/drawing/2010/main">
+        <mc:Choice Requires="a14">
           <p:sp>
             <p:nvSpPr>
               <p:cNvPr id="157" name="TextBox 156">
@@ -15654,7 +15922,7 @@
             </p:txBody>
           </p:sp>
         </mc:Choice>
-        <mc:Fallback>
+        <mc:Fallback xmlns="">
           <p:sp>
             <p:nvSpPr>
               <p:cNvPr id="157" name="TextBox 156">
@@ -15699,8 +15967,8 @@
           </p:sp>
         </mc:Fallback>
       </mc:AlternateContent>
-      <mc:AlternateContent xmlns:mc="http://schemas.openxmlformats.org/markup-compatibility/2006">
-        <mc:Choice xmlns:a14="http://schemas.microsoft.com/office/drawing/2010/main" Requires="a14">
+      <mc:AlternateContent xmlns:mc="http://schemas.openxmlformats.org/markup-compatibility/2006" xmlns:a14="http://schemas.microsoft.com/office/drawing/2010/main">
+        <mc:Choice Requires="a14">
           <p:sp>
             <p:nvSpPr>
               <p:cNvPr id="158" name="TextBox 157">
@@ -15962,7 +16230,7 @@
             </p:txBody>
           </p:sp>
         </mc:Choice>
-        <mc:Fallback>
+        <mc:Fallback xmlns="">
           <p:sp>
             <p:nvSpPr>
               <p:cNvPr id="158" name="TextBox 157">
@@ -17218,8 +17486,8 @@
             </a:p>
           </p:txBody>
         </p:sp>
-        <mc:AlternateContent xmlns:mc="http://schemas.openxmlformats.org/markup-compatibility/2006">
-          <mc:Choice xmlns:a14="http://schemas.microsoft.com/office/drawing/2010/main" Requires="a14">
+        <mc:AlternateContent xmlns:mc="http://schemas.openxmlformats.org/markup-compatibility/2006" xmlns:a14="http://schemas.microsoft.com/office/drawing/2010/main">
+          <mc:Choice Requires="a14">
             <p:sp>
               <p:nvSpPr>
                 <p:cNvPr id="183" name="TextBox 182">
@@ -17288,7 +17556,7 @@
               </p:txBody>
             </p:sp>
           </mc:Choice>
-          <mc:Fallback>
+          <mc:Fallback xmlns="">
             <p:sp>
               <p:nvSpPr>
                 <p:cNvPr id="183" name="TextBox 182">
@@ -17403,8 +17671,8 @@
             </a:p>
           </p:txBody>
         </p:sp>
-        <mc:AlternateContent xmlns:mc="http://schemas.openxmlformats.org/markup-compatibility/2006">
-          <mc:Choice xmlns:a14="http://schemas.microsoft.com/office/drawing/2010/main" Requires="a14">
+        <mc:AlternateContent xmlns:mc="http://schemas.openxmlformats.org/markup-compatibility/2006" xmlns:a14="http://schemas.microsoft.com/office/drawing/2010/main">
+          <mc:Choice Requires="a14">
             <p:sp>
               <p:nvSpPr>
                 <p:cNvPr id="186" name="TextBox 185">
@@ -17473,7 +17741,7 @@
               </p:txBody>
             </p:sp>
           </mc:Choice>
-          <mc:Fallback>
+          <mc:Fallback xmlns="">
             <p:sp>
               <p:nvSpPr>
                 <p:cNvPr id="186" name="TextBox 185">
@@ -17588,8 +17856,8 @@
             </a:p>
           </p:txBody>
         </p:sp>
-        <mc:AlternateContent xmlns:mc="http://schemas.openxmlformats.org/markup-compatibility/2006">
-          <mc:Choice xmlns:a14="http://schemas.microsoft.com/office/drawing/2010/main" Requires="a14">
+        <mc:AlternateContent xmlns:mc="http://schemas.openxmlformats.org/markup-compatibility/2006" xmlns:a14="http://schemas.microsoft.com/office/drawing/2010/main">
+          <mc:Choice Requires="a14">
             <p:sp>
               <p:nvSpPr>
                 <p:cNvPr id="189" name="TextBox 188">
@@ -17658,7 +17926,7 @@
               </p:txBody>
             </p:sp>
           </mc:Choice>
-          <mc:Fallback>
+          <mc:Fallback xmlns="">
             <p:sp>
               <p:nvSpPr>
                 <p:cNvPr id="189" name="TextBox 188">
@@ -17773,8 +18041,8 @@
             </a:p>
           </p:txBody>
         </p:sp>
-        <mc:AlternateContent xmlns:mc="http://schemas.openxmlformats.org/markup-compatibility/2006">
-          <mc:Choice xmlns:a14="http://schemas.microsoft.com/office/drawing/2010/main" Requires="a14">
+        <mc:AlternateContent xmlns:mc="http://schemas.openxmlformats.org/markup-compatibility/2006" xmlns:a14="http://schemas.microsoft.com/office/drawing/2010/main">
+          <mc:Choice Requires="a14">
             <p:sp>
               <p:nvSpPr>
                 <p:cNvPr id="192" name="TextBox 191">
@@ -17843,7 +18111,7 @@
               </p:txBody>
             </p:sp>
           </mc:Choice>
-          <mc:Fallback>
+          <mc:Fallback xmlns="">
             <p:sp>
               <p:nvSpPr>
                 <p:cNvPr id="192" name="TextBox 191">
@@ -17889,8 +18157,8 @@
           </mc:Fallback>
         </mc:AlternateContent>
       </p:grpSp>
-      <mc:AlternateContent xmlns:mc="http://schemas.openxmlformats.org/markup-compatibility/2006">
-        <mc:Choice xmlns:a14="http://schemas.microsoft.com/office/drawing/2010/main" Requires="a14">
+      <mc:AlternateContent xmlns:mc="http://schemas.openxmlformats.org/markup-compatibility/2006" xmlns:a14="http://schemas.microsoft.com/office/drawing/2010/main">
+        <mc:Choice Requires="a14">
           <p:sp>
             <p:nvSpPr>
               <p:cNvPr id="196" name="TextBox 195">
@@ -18127,7 +18395,7 @@
             </p:txBody>
           </p:sp>
         </mc:Choice>
-        <mc:Fallback>
+        <mc:Fallback xmlns="">
           <p:sp>
             <p:nvSpPr>
               <p:cNvPr id="196" name="TextBox 195">

</xml_diff>